<commit_message>
Estruturação do projeto completa...
</commit_message>
<xml_diff>
--- a/project/Disparador de e-mails.pptx
+++ b/project/Disparador de e-mails.pptx
@@ -9325,15 +9325,6 @@
 </file>
 
 <file path=customXml/item2.xml><?xml version="1.0" encoding="utf-8"?>
-<?mso-contentType ?>
-<FormTemplates xmlns="http://schemas.microsoft.com/sharepoint/v3/contenttype/forms">
-  <Display>DocumentLibraryForm</Display>
-  <Edit>DocumentLibraryForm</Edit>
-  <New>DocumentLibraryForm</New>
-</FormTemplates>
-</file>
-
-<file path=customXml/item3.xml><?xml version="1.0" encoding="utf-8"?>
 <ct:contentTypeSchema xmlns:ct="http://schemas.microsoft.com/office/2006/metadata/contentType" xmlns:ma="http://schemas.microsoft.com/office/2006/metadata/properties/metaAttributes" ct:_="" ma:_="" ma:contentTypeName="Document" ma:contentTypeID="0x010100C3F2F542F24BDE4A8BDD1F998CE000E0" ma:contentTypeVersion="0" ma:contentTypeDescription="Create a new document." ma:contentTypeScope="" ma:versionID="83c008e66cd718e5434bebb352930021">
   <xsd:schema xmlns:xsd="http://www.w3.org/2001/XMLSchema" xmlns:xs="http://www.w3.org/2001/XMLSchema" xmlns:p="http://schemas.microsoft.com/office/2006/metadata/properties" targetNamespace="http://schemas.microsoft.com/office/2006/metadata/properties" ma:root="true" ma:fieldsID="03894abc7ab974918b1bcad8e2aab8dc">
     <xsd:element name="properties">
@@ -9447,6 +9438,15 @@
 </ct:contentTypeSchema>
 </file>
 
+<file path=customXml/item3.xml><?xml version="1.0" encoding="utf-8"?>
+<?mso-contentType ?>
+<FormTemplates xmlns="http://schemas.microsoft.com/sharepoint/v3/contenttype/forms">
+  <Display>DocumentLibraryForm</Display>
+  <Edit>DocumentLibraryForm</Edit>
+  <New>DocumentLibraryForm</New>
+</FormTemplates>
+</file>
+
 <file path=customXml/itemProps1.xml><?xml version="1.0" encoding="utf-8"?>
 <ds:datastoreItem xmlns:ds="http://schemas.openxmlformats.org/officeDocument/2006/customXml" ds:itemID="{D92A37AC-82B8-4757-B769-8788BA0CD134}">
   <ds:schemaRefs>
@@ -9463,14 +9463,6 @@
 </file>
 
 <file path=customXml/itemProps2.xml><?xml version="1.0" encoding="utf-8"?>
-<ds:datastoreItem xmlns:ds="http://schemas.openxmlformats.org/officeDocument/2006/customXml" ds:itemID="{5C305631-AD9C-4BAB-B2EF-E6B08D4CD95A}">
-  <ds:schemaRefs>
-    <ds:schemaRef ds:uri="http://schemas.microsoft.com/sharepoint/v3/contenttype/forms"/>
-  </ds:schemaRefs>
-</ds:datastoreItem>
-</file>
-
-<file path=customXml/itemProps3.xml><?xml version="1.0" encoding="utf-8"?>
 <ds:datastoreItem xmlns:ds="http://schemas.openxmlformats.org/officeDocument/2006/customXml" ds:itemID="{22369BFB-2BFA-4153-B86E-B451C23AA0DB}">
   <ds:schemaRefs>
     <ds:schemaRef ds:uri="http://schemas.microsoft.com/office/2006/metadata/contentType"/>
@@ -9484,4 +9476,12 @@
     <ds:schemaRef ds:uri="http://schemas.microsoft.com/office/infopath/2007/PartnerControls"/>
   </ds:schemaRefs>
 </ds:datastoreItem>
+</file>
+
+<file path=customXml/itemProps3.xml><?xml version="1.0" encoding="utf-8"?>
+<ds:datastoreItem xmlns:ds="http://schemas.openxmlformats.org/officeDocument/2006/customXml" ds:itemID="{5C305631-AD9C-4BAB-B2EF-E6B08D4CD95A}">
+  <ds:schemaRefs>
+    <ds:schemaRef ds:uri="http://schemas.microsoft.com/sharepoint/v3/contenttype/forms"/>
+  </ds:schemaRefs>
+</ds:datastoreItem>
 </file>
</xml_diff>

<commit_message>
Classe: Email - concluída...
</commit_message>
<xml_diff>
--- a/project/Disparador de e-mails.pptx
+++ b/project/Disparador de e-mails.pptx
@@ -274,7 +274,7 @@
           <a:p>
             <a:fld id="{B83CCE6F-1D0A-4071-99E3-A2D64F5A9666}" type="datetimeFigureOut">
               <a:rPr lang="en-US" smtClean="0"/>
-              <a:t>4/20/2020</a:t>
+              <a:t>4/21/2020</a:t>
             </a:fld>
             <a:endParaRPr lang="en-US"/>
           </a:p>
@@ -474,7 +474,7 @@
           <a:p>
             <a:fld id="{B83CCE6F-1D0A-4071-99E3-A2D64F5A9666}" type="datetimeFigureOut">
               <a:rPr lang="en-US" smtClean="0"/>
-              <a:t>4/20/2020</a:t>
+              <a:t>4/21/2020</a:t>
             </a:fld>
             <a:endParaRPr lang="en-US"/>
           </a:p>
@@ -684,7 +684,7 @@
           <a:p>
             <a:fld id="{B83CCE6F-1D0A-4071-99E3-A2D64F5A9666}" type="datetimeFigureOut">
               <a:rPr lang="en-US" smtClean="0"/>
-              <a:t>4/20/2020</a:t>
+              <a:t>4/21/2020</a:t>
             </a:fld>
             <a:endParaRPr lang="en-US"/>
           </a:p>
@@ -884,7 +884,7 @@
           <a:p>
             <a:fld id="{B83CCE6F-1D0A-4071-99E3-A2D64F5A9666}" type="datetimeFigureOut">
               <a:rPr lang="en-US" smtClean="0"/>
-              <a:t>4/20/2020</a:t>
+              <a:t>4/21/2020</a:t>
             </a:fld>
             <a:endParaRPr lang="en-US"/>
           </a:p>
@@ -1160,7 +1160,7 @@
           <a:p>
             <a:fld id="{B83CCE6F-1D0A-4071-99E3-A2D64F5A9666}" type="datetimeFigureOut">
               <a:rPr lang="en-US" smtClean="0"/>
-              <a:t>4/20/2020</a:t>
+              <a:t>4/21/2020</a:t>
             </a:fld>
             <a:endParaRPr lang="en-US"/>
           </a:p>
@@ -1428,7 +1428,7 @@
           <a:p>
             <a:fld id="{B83CCE6F-1D0A-4071-99E3-A2D64F5A9666}" type="datetimeFigureOut">
               <a:rPr lang="en-US" smtClean="0"/>
-              <a:t>4/20/2020</a:t>
+              <a:t>4/21/2020</a:t>
             </a:fld>
             <a:endParaRPr lang="en-US"/>
           </a:p>
@@ -1843,7 +1843,7 @@
           <a:p>
             <a:fld id="{B83CCE6F-1D0A-4071-99E3-A2D64F5A9666}" type="datetimeFigureOut">
               <a:rPr lang="en-US" smtClean="0"/>
-              <a:t>4/20/2020</a:t>
+              <a:t>4/21/2020</a:t>
             </a:fld>
             <a:endParaRPr lang="en-US"/>
           </a:p>
@@ -1985,7 +1985,7 @@
           <a:p>
             <a:fld id="{B83CCE6F-1D0A-4071-99E3-A2D64F5A9666}" type="datetimeFigureOut">
               <a:rPr lang="en-US" smtClean="0"/>
-              <a:t>4/20/2020</a:t>
+              <a:t>4/21/2020</a:t>
             </a:fld>
             <a:endParaRPr lang="en-US"/>
           </a:p>
@@ -2098,7 +2098,7 @@
           <a:p>
             <a:fld id="{B83CCE6F-1D0A-4071-99E3-A2D64F5A9666}" type="datetimeFigureOut">
               <a:rPr lang="en-US" smtClean="0"/>
-              <a:t>4/20/2020</a:t>
+              <a:t>4/21/2020</a:t>
             </a:fld>
             <a:endParaRPr lang="en-US"/>
           </a:p>
@@ -2411,7 +2411,7 @@
           <a:p>
             <a:fld id="{B83CCE6F-1D0A-4071-99E3-A2D64F5A9666}" type="datetimeFigureOut">
               <a:rPr lang="en-US" smtClean="0"/>
-              <a:t>4/20/2020</a:t>
+              <a:t>4/21/2020</a:t>
             </a:fld>
             <a:endParaRPr lang="en-US"/>
           </a:p>
@@ -2700,7 +2700,7 @@
           <a:p>
             <a:fld id="{B83CCE6F-1D0A-4071-99E3-A2D64F5A9666}" type="datetimeFigureOut">
               <a:rPr lang="en-US" smtClean="0"/>
-              <a:t>4/20/2020</a:t>
+              <a:t>4/21/2020</a:t>
             </a:fld>
             <a:endParaRPr lang="en-US"/>
           </a:p>
@@ -2943,7 +2943,7 @@
           <a:p>
             <a:fld id="{B83CCE6F-1D0A-4071-99E3-A2D64F5A9666}" type="datetimeFigureOut">
               <a:rPr lang="en-US" smtClean="0"/>
-              <a:t>4/20/2020</a:t>
+              <a:t>4/21/2020</a:t>
             </a:fld>
             <a:endParaRPr lang="en-US"/>
           </a:p>
@@ -8349,7 +8349,7 @@
         <p:spPr>
           <a:xfrm>
             <a:off x="3352800" y="2562446"/>
-            <a:ext cx="5486400" cy="923330"/>
+            <a:ext cx="5486400" cy="1200329"/>
           </a:xfrm>
           <a:prstGeom prst="rect">
             <a:avLst/>
@@ -8361,6 +8361,25 @@
             <a:spAutoFit/>
           </a:bodyPr>
           <a:lstStyle/>
+          <a:p>
+            <a:pPr marL="285750" indent="-285750" algn="ctr">
+              <a:buFontTx/>
+              <a:buChar char="-"/>
+            </a:pPr>
+            <a:r>
+              <a:rPr lang="en-US" dirty="0" err="1">
+                <a:solidFill>
+                  <a:schemeClr val="bg1"/>
+                </a:solidFill>
+              </a:rPr>
+              <a:t>EmailCompleto</a:t>
+            </a:r>
+            <a:endParaRPr lang="en-US" dirty="0">
+              <a:solidFill>
+                <a:schemeClr val="bg1"/>
+              </a:solidFill>
+            </a:endParaRPr>
+          </a:p>
           <a:p>
             <a:pPr marL="285750" indent="-285750" algn="ctr">
               <a:buFontTx/>
@@ -8474,7 +8493,7 @@
         <p:spPr>
           <a:xfrm>
             <a:off x="3352800" y="4382315"/>
-            <a:ext cx="5486400" cy="1754326"/>
+            <a:ext cx="5486400" cy="1200329"/>
           </a:xfrm>
           <a:prstGeom prst="rect">
             <a:avLst/>
@@ -8497,7 +8516,7 @@
                   <a:schemeClr val="bg1"/>
                 </a:solidFill>
               </a:rPr>
-              <a:t>TrataPreArroba</a:t>
+              <a:t>ValidaPreArroba</a:t>
             </a:r>
             <a:endParaRPr lang="en-US" dirty="0">
               <a:solidFill>
@@ -8516,7 +8535,7 @@
                   <a:schemeClr val="bg1"/>
                 </a:solidFill>
               </a:rPr>
-              <a:t>ValidaPreArroba</a:t>
+              <a:t>ValidaEmailCompleto</a:t>
             </a:r>
             <a:endParaRPr lang="en-US" dirty="0">
               <a:solidFill>
@@ -8535,45 +8554,7 @@
                   <a:schemeClr val="bg1"/>
                 </a:solidFill>
               </a:rPr>
-              <a:t>TrataPosArroba</a:t>
-            </a:r>
-            <a:endParaRPr lang="en-US" dirty="0">
-              <a:solidFill>
-                <a:schemeClr val="bg1"/>
-              </a:solidFill>
-            </a:endParaRPr>
-          </a:p>
-          <a:p>
-            <a:pPr marL="285750" indent="-285750" algn="ctr">
-              <a:buFontTx/>
-              <a:buChar char="-"/>
-            </a:pPr>
-            <a:r>
-              <a:rPr lang="en-US" dirty="0" err="1">
-                <a:solidFill>
-                  <a:schemeClr val="bg1"/>
-                </a:solidFill>
-              </a:rPr>
               <a:t>ValidaPosArroba</a:t>
-            </a:r>
-            <a:endParaRPr lang="en-US" dirty="0">
-              <a:solidFill>
-                <a:schemeClr val="bg1"/>
-              </a:solidFill>
-            </a:endParaRPr>
-          </a:p>
-          <a:p>
-            <a:pPr marL="285750" indent="-285750" algn="ctr">
-              <a:buFontTx/>
-              <a:buChar char="-"/>
-            </a:pPr>
-            <a:r>
-              <a:rPr lang="en-US" dirty="0" err="1">
-                <a:solidFill>
-                  <a:schemeClr val="bg1"/>
-                </a:solidFill>
-              </a:rPr>
-              <a:t>Plataforma</a:t>
             </a:r>
             <a:endParaRPr lang="en-US" dirty="0">
               <a:solidFill>
@@ -9325,6 +9306,15 @@
 </file>
 
 <file path=customXml/item2.xml><?xml version="1.0" encoding="utf-8"?>
+<?mso-contentType ?>
+<FormTemplates xmlns="http://schemas.microsoft.com/sharepoint/v3/contenttype/forms">
+  <Display>DocumentLibraryForm</Display>
+  <Edit>DocumentLibraryForm</Edit>
+  <New>DocumentLibraryForm</New>
+</FormTemplates>
+</file>
+
+<file path=customXml/item3.xml><?xml version="1.0" encoding="utf-8"?>
 <ct:contentTypeSchema xmlns:ct="http://schemas.microsoft.com/office/2006/metadata/contentType" xmlns:ma="http://schemas.microsoft.com/office/2006/metadata/properties/metaAttributes" ct:_="" ma:_="" ma:contentTypeName="Document" ma:contentTypeID="0x010100C3F2F542F24BDE4A8BDD1F998CE000E0" ma:contentTypeVersion="0" ma:contentTypeDescription="Create a new document." ma:contentTypeScope="" ma:versionID="83c008e66cd718e5434bebb352930021">
   <xsd:schema xmlns:xsd="http://www.w3.org/2001/XMLSchema" xmlns:xs="http://www.w3.org/2001/XMLSchema" xmlns:p="http://schemas.microsoft.com/office/2006/metadata/properties" targetNamespace="http://schemas.microsoft.com/office/2006/metadata/properties" ma:root="true" ma:fieldsID="03894abc7ab974918b1bcad8e2aab8dc">
     <xsd:element name="properties">
@@ -9438,15 +9428,6 @@
 </ct:contentTypeSchema>
 </file>
 
-<file path=customXml/item3.xml><?xml version="1.0" encoding="utf-8"?>
-<?mso-contentType ?>
-<FormTemplates xmlns="http://schemas.microsoft.com/sharepoint/v3/contenttype/forms">
-  <Display>DocumentLibraryForm</Display>
-  <Edit>DocumentLibraryForm</Edit>
-  <New>DocumentLibraryForm</New>
-</FormTemplates>
-</file>
-
 <file path=customXml/itemProps1.xml><?xml version="1.0" encoding="utf-8"?>
 <ds:datastoreItem xmlns:ds="http://schemas.openxmlformats.org/officeDocument/2006/customXml" ds:itemID="{D92A37AC-82B8-4757-B769-8788BA0CD134}">
   <ds:schemaRefs>
@@ -9463,6 +9444,14 @@
 </file>
 
 <file path=customXml/itemProps2.xml><?xml version="1.0" encoding="utf-8"?>
+<ds:datastoreItem xmlns:ds="http://schemas.openxmlformats.org/officeDocument/2006/customXml" ds:itemID="{5C305631-AD9C-4BAB-B2EF-E6B08D4CD95A}">
+  <ds:schemaRefs>
+    <ds:schemaRef ds:uri="http://schemas.microsoft.com/sharepoint/v3/contenttype/forms"/>
+  </ds:schemaRefs>
+</ds:datastoreItem>
+</file>
+
+<file path=customXml/itemProps3.xml><?xml version="1.0" encoding="utf-8"?>
 <ds:datastoreItem xmlns:ds="http://schemas.openxmlformats.org/officeDocument/2006/customXml" ds:itemID="{22369BFB-2BFA-4153-B86E-B451C23AA0DB}">
   <ds:schemaRefs>
     <ds:schemaRef ds:uri="http://schemas.microsoft.com/office/2006/metadata/contentType"/>
@@ -9476,12 +9465,4 @@
     <ds:schemaRef ds:uri="http://schemas.microsoft.com/office/infopath/2007/PartnerControls"/>
   </ds:schemaRefs>
 </ds:datastoreItem>
-</file>
-
-<file path=customXml/itemProps3.xml><?xml version="1.0" encoding="utf-8"?>
-<ds:datastoreItem xmlns:ds="http://schemas.openxmlformats.org/officeDocument/2006/customXml" ds:itemID="{5C305631-AD9C-4BAB-B2EF-E6B08D4CD95A}">
-  <ds:schemaRefs>
-    <ds:schemaRef ds:uri="http://schemas.microsoft.com/sharepoint/v3/contenttype/forms"/>
-  </ds:schemaRefs>
-</ds:datastoreItem>
 </file>
</xml_diff>

<commit_message>
Classe: OutlookMail - concluída
</commit_message>
<xml_diff>
--- a/project/Disparador de e-mails.pptx
+++ b/project/Disparador de e-mails.pptx
@@ -8737,7 +8737,7 @@
         </p:nvCxnSpPr>
         <p:spPr>
           <a:xfrm>
-            <a:off x="3352800" y="4880343"/>
+            <a:off x="3352800" y="5305645"/>
             <a:ext cx="5486400" cy="0"/>
           </a:xfrm>
           <a:prstGeom prst="line">
@@ -8813,8 +8813,8 @@
         </p:nvSpPr>
         <p:spPr>
           <a:xfrm>
-            <a:off x="3352800" y="2772379"/>
-            <a:ext cx="5486400" cy="1477328"/>
+            <a:off x="3352800" y="2837534"/>
+            <a:ext cx="5486400" cy="1754326"/>
           </a:xfrm>
           <a:prstGeom prst="rect">
             <a:avLst/>
@@ -8913,7 +8913,21 @@
                   <a:schemeClr val="bg1"/>
                 </a:solidFill>
               </a:rPr>
-              <a:t>SMPT Server</a:t>
+              <a:t>SMP Server</a:t>
+            </a:r>
+          </a:p>
+          <a:p>
+            <a:pPr marL="285750" indent="-285750" algn="ctr">
+              <a:buFontTx/>
+              <a:buChar char="-"/>
+            </a:pPr>
+            <a:r>
+              <a:rPr lang="en-US" dirty="0">
+                <a:solidFill>
+                  <a:schemeClr val="bg1"/>
+                </a:solidFill>
+              </a:rPr>
+              <a:t>SMTP Port</a:t>
             </a:r>
           </a:p>
         </p:txBody>
@@ -8932,8 +8946,8 @@
         </p:nvSpPr>
         <p:spPr>
           <a:xfrm>
-            <a:off x="3352800" y="5191496"/>
-            <a:ext cx="5486400" cy="646331"/>
+            <a:off x="3352800" y="5594128"/>
+            <a:ext cx="5486400" cy="369332"/>
           </a:xfrm>
           <a:prstGeom prst="rect">
             <a:avLst/>
@@ -8965,28 +8979,6 @@
                 </a:solidFill>
               </a:rPr>
               <a:t> e-mail</a:t>
-            </a:r>
-          </a:p>
-          <a:p>
-            <a:pPr marL="285750" indent="-285750" algn="ctr">
-              <a:buFontTx/>
-              <a:buChar char="-"/>
-            </a:pPr>
-            <a:r>
-              <a:rPr lang="en-US" dirty="0" err="1">
-                <a:solidFill>
-                  <a:schemeClr val="bg1"/>
-                </a:solidFill>
-              </a:rPr>
-              <a:t>Retorna</a:t>
-            </a:r>
-            <a:r>
-              <a:rPr lang="en-US" dirty="0">
-                <a:solidFill>
-                  <a:schemeClr val="bg1"/>
-                </a:solidFill>
-              </a:rPr>
-              <a:t> Log</a:t>
             </a:r>
           </a:p>
         </p:txBody>
@@ -9306,15 +9298,6 @@
 </file>
 
 <file path=customXml/item2.xml><?xml version="1.0" encoding="utf-8"?>
-<?mso-contentType ?>
-<FormTemplates xmlns="http://schemas.microsoft.com/sharepoint/v3/contenttype/forms">
-  <Display>DocumentLibraryForm</Display>
-  <Edit>DocumentLibraryForm</Edit>
-  <New>DocumentLibraryForm</New>
-</FormTemplates>
-</file>
-
-<file path=customXml/item3.xml><?xml version="1.0" encoding="utf-8"?>
 <ct:contentTypeSchema xmlns:ct="http://schemas.microsoft.com/office/2006/metadata/contentType" xmlns:ma="http://schemas.microsoft.com/office/2006/metadata/properties/metaAttributes" ct:_="" ma:_="" ma:contentTypeName="Document" ma:contentTypeID="0x010100C3F2F542F24BDE4A8BDD1F998CE000E0" ma:contentTypeVersion="0" ma:contentTypeDescription="Create a new document." ma:contentTypeScope="" ma:versionID="83c008e66cd718e5434bebb352930021">
   <xsd:schema xmlns:xsd="http://www.w3.org/2001/XMLSchema" xmlns:xs="http://www.w3.org/2001/XMLSchema" xmlns:p="http://schemas.microsoft.com/office/2006/metadata/properties" targetNamespace="http://schemas.microsoft.com/office/2006/metadata/properties" ma:root="true" ma:fieldsID="03894abc7ab974918b1bcad8e2aab8dc">
     <xsd:element name="properties">
@@ -9428,6 +9411,15 @@
 </ct:contentTypeSchema>
 </file>
 
+<file path=customXml/item3.xml><?xml version="1.0" encoding="utf-8"?>
+<?mso-contentType ?>
+<FormTemplates xmlns="http://schemas.microsoft.com/sharepoint/v3/contenttype/forms">
+  <Display>DocumentLibraryForm</Display>
+  <Edit>DocumentLibraryForm</Edit>
+  <New>DocumentLibraryForm</New>
+</FormTemplates>
+</file>
+
 <file path=customXml/itemProps1.xml><?xml version="1.0" encoding="utf-8"?>
 <ds:datastoreItem xmlns:ds="http://schemas.openxmlformats.org/officeDocument/2006/customXml" ds:itemID="{D92A37AC-82B8-4757-B769-8788BA0CD134}">
   <ds:schemaRefs>
@@ -9444,14 +9436,6 @@
 </file>
 
 <file path=customXml/itemProps2.xml><?xml version="1.0" encoding="utf-8"?>
-<ds:datastoreItem xmlns:ds="http://schemas.openxmlformats.org/officeDocument/2006/customXml" ds:itemID="{5C305631-AD9C-4BAB-B2EF-E6B08D4CD95A}">
-  <ds:schemaRefs>
-    <ds:schemaRef ds:uri="http://schemas.microsoft.com/sharepoint/v3/contenttype/forms"/>
-  </ds:schemaRefs>
-</ds:datastoreItem>
-</file>
-
-<file path=customXml/itemProps3.xml><?xml version="1.0" encoding="utf-8"?>
 <ds:datastoreItem xmlns:ds="http://schemas.openxmlformats.org/officeDocument/2006/customXml" ds:itemID="{22369BFB-2BFA-4153-B86E-B451C23AA0DB}">
   <ds:schemaRefs>
     <ds:schemaRef ds:uri="http://schemas.microsoft.com/office/2006/metadata/contentType"/>
@@ -9465,4 +9449,12 @@
     <ds:schemaRef ds:uri="http://schemas.microsoft.com/office/infopath/2007/PartnerControls"/>
   </ds:schemaRefs>
 </ds:datastoreItem>
+</file>
+
+<file path=customXml/itemProps3.xml><?xml version="1.0" encoding="utf-8"?>
+<ds:datastoreItem xmlns:ds="http://schemas.openxmlformats.org/officeDocument/2006/customXml" ds:itemID="{5C305631-AD9C-4BAB-B2EF-E6B08D4CD95A}">
+  <ds:schemaRefs>
+    <ds:schemaRef ds:uri="http://schemas.microsoft.com/sharepoint/v3/contenttype/forms"/>
+  </ds:schemaRefs>
+</ds:datastoreItem>
 </file>
</xml_diff>

<commit_message>
modificação na estrutura das pastas na pasta log_paste
</commit_message>
<xml_diff>
--- a/project/Disparador de e-mails.pptx
+++ b/project/Disparador de e-mails.pptx
@@ -274,7 +274,7 @@
           <a:p>
             <a:fld id="{B83CCE6F-1D0A-4071-99E3-A2D64F5A9666}" type="datetimeFigureOut">
               <a:rPr lang="en-US" smtClean="0"/>
-              <a:t>4/21/2020</a:t>
+              <a:t>4/22/2020</a:t>
             </a:fld>
             <a:endParaRPr lang="en-US"/>
           </a:p>
@@ -474,7 +474,7 @@
           <a:p>
             <a:fld id="{B83CCE6F-1D0A-4071-99E3-A2D64F5A9666}" type="datetimeFigureOut">
               <a:rPr lang="en-US" smtClean="0"/>
-              <a:t>4/21/2020</a:t>
+              <a:t>4/22/2020</a:t>
             </a:fld>
             <a:endParaRPr lang="en-US"/>
           </a:p>
@@ -684,7 +684,7 @@
           <a:p>
             <a:fld id="{B83CCE6F-1D0A-4071-99E3-A2D64F5A9666}" type="datetimeFigureOut">
               <a:rPr lang="en-US" smtClean="0"/>
-              <a:t>4/21/2020</a:t>
+              <a:t>4/22/2020</a:t>
             </a:fld>
             <a:endParaRPr lang="en-US"/>
           </a:p>
@@ -884,7 +884,7 @@
           <a:p>
             <a:fld id="{B83CCE6F-1D0A-4071-99E3-A2D64F5A9666}" type="datetimeFigureOut">
               <a:rPr lang="en-US" smtClean="0"/>
-              <a:t>4/21/2020</a:t>
+              <a:t>4/22/2020</a:t>
             </a:fld>
             <a:endParaRPr lang="en-US"/>
           </a:p>
@@ -1160,7 +1160,7 @@
           <a:p>
             <a:fld id="{B83CCE6F-1D0A-4071-99E3-A2D64F5A9666}" type="datetimeFigureOut">
               <a:rPr lang="en-US" smtClean="0"/>
-              <a:t>4/21/2020</a:t>
+              <a:t>4/22/2020</a:t>
             </a:fld>
             <a:endParaRPr lang="en-US"/>
           </a:p>
@@ -1428,7 +1428,7 @@
           <a:p>
             <a:fld id="{B83CCE6F-1D0A-4071-99E3-A2D64F5A9666}" type="datetimeFigureOut">
               <a:rPr lang="en-US" smtClean="0"/>
-              <a:t>4/21/2020</a:t>
+              <a:t>4/22/2020</a:t>
             </a:fld>
             <a:endParaRPr lang="en-US"/>
           </a:p>
@@ -1843,7 +1843,7 @@
           <a:p>
             <a:fld id="{B83CCE6F-1D0A-4071-99E3-A2D64F5A9666}" type="datetimeFigureOut">
               <a:rPr lang="en-US" smtClean="0"/>
-              <a:t>4/21/2020</a:t>
+              <a:t>4/22/2020</a:t>
             </a:fld>
             <a:endParaRPr lang="en-US"/>
           </a:p>
@@ -1985,7 +1985,7 @@
           <a:p>
             <a:fld id="{B83CCE6F-1D0A-4071-99E3-A2D64F5A9666}" type="datetimeFigureOut">
               <a:rPr lang="en-US" smtClean="0"/>
-              <a:t>4/21/2020</a:t>
+              <a:t>4/22/2020</a:t>
             </a:fld>
             <a:endParaRPr lang="en-US"/>
           </a:p>
@@ -2098,7 +2098,7 @@
           <a:p>
             <a:fld id="{B83CCE6F-1D0A-4071-99E3-A2D64F5A9666}" type="datetimeFigureOut">
               <a:rPr lang="en-US" smtClean="0"/>
-              <a:t>4/21/2020</a:t>
+              <a:t>4/22/2020</a:t>
             </a:fld>
             <a:endParaRPr lang="en-US"/>
           </a:p>
@@ -2411,7 +2411,7 @@
           <a:p>
             <a:fld id="{B83CCE6F-1D0A-4071-99E3-A2D64F5A9666}" type="datetimeFigureOut">
               <a:rPr lang="en-US" smtClean="0"/>
-              <a:t>4/21/2020</a:t>
+              <a:t>4/22/2020</a:t>
             </a:fld>
             <a:endParaRPr lang="en-US"/>
           </a:p>
@@ -2700,7 +2700,7 @@
           <a:p>
             <a:fld id="{B83CCE6F-1D0A-4071-99E3-A2D64F5A9666}" type="datetimeFigureOut">
               <a:rPr lang="en-US" smtClean="0"/>
-              <a:t>4/21/2020</a:t>
+              <a:t>4/22/2020</a:t>
             </a:fld>
             <a:endParaRPr lang="en-US"/>
           </a:p>
@@ -2943,7 +2943,7 @@
           <a:p>
             <a:fld id="{B83CCE6F-1D0A-4071-99E3-A2D64F5A9666}" type="datetimeFigureOut">
               <a:rPr lang="en-US" smtClean="0"/>
-              <a:t>4/21/2020</a:t>
+              <a:t>4/22/2020</a:t>
             </a:fld>
             <a:endParaRPr lang="en-US"/>
           </a:p>
@@ -4757,7 +4757,7 @@
         </p:nvCxnSpPr>
         <p:spPr>
           <a:xfrm>
-            <a:off x="3352800" y="4710223"/>
+            <a:off x="3352800" y="4405752"/>
             <a:ext cx="5486400" cy="0"/>
           </a:xfrm>
           <a:prstGeom prst="line">
@@ -4899,7 +4899,7 @@
                   <a:schemeClr val="bg1"/>
                 </a:solidFill>
               </a:rPr>
-              <a:t>Name</a:t>
+              <a:t>Password</a:t>
             </a:r>
           </a:p>
           <a:p>
@@ -4965,8 +4965,8 @@
         </p:nvSpPr>
         <p:spPr>
           <a:xfrm>
-            <a:off x="3352800" y="5237662"/>
-            <a:ext cx="5486400" cy="646331"/>
+            <a:off x="3352800" y="4683665"/>
+            <a:ext cx="5486400" cy="1754326"/>
           </a:xfrm>
           <a:prstGeom prst="rect">
             <a:avLst/>
@@ -4978,6 +4978,82 @@
             <a:spAutoFit/>
           </a:bodyPr>
           <a:lstStyle/>
+          <a:p>
+            <a:pPr marL="285750" indent="-285750" algn="ctr">
+              <a:buFontTx/>
+              <a:buChar char="-"/>
+            </a:pPr>
+            <a:r>
+              <a:rPr lang="en-US" dirty="0" err="1">
+                <a:solidFill>
+                  <a:schemeClr val="bg1"/>
+                </a:solidFill>
+              </a:rPr>
+              <a:t>ConectarBase</a:t>
+            </a:r>
+            <a:endParaRPr lang="en-US" dirty="0">
+              <a:solidFill>
+                <a:schemeClr val="bg1"/>
+              </a:solidFill>
+            </a:endParaRPr>
+          </a:p>
+          <a:p>
+            <a:pPr marL="285750" indent="-285750" algn="ctr">
+              <a:buFontTx/>
+              <a:buChar char="-"/>
+            </a:pPr>
+            <a:r>
+              <a:rPr lang="en-US" dirty="0" err="1">
+                <a:solidFill>
+                  <a:schemeClr val="bg1"/>
+                </a:solidFill>
+              </a:rPr>
+              <a:t>DesconectarBase</a:t>
+            </a:r>
+            <a:endParaRPr lang="en-US" dirty="0">
+              <a:solidFill>
+                <a:schemeClr val="bg1"/>
+              </a:solidFill>
+            </a:endParaRPr>
+          </a:p>
+          <a:p>
+            <a:pPr marL="285750" indent="-285750" algn="ctr">
+              <a:buFontTx/>
+              <a:buChar char="-"/>
+            </a:pPr>
+            <a:r>
+              <a:rPr lang="en-US" dirty="0" err="1">
+                <a:solidFill>
+                  <a:schemeClr val="bg1"/>
+                </a:solidFill>
+              </a:rPr>
+              <a:t>ConectarCursor</a:t>
+            </a:r>
+            <a:endParaRPr lang="en-US" dirty="0">
+              <a:solidFill>
+                <a:schemeClr val="bg1"/>
+              </a:solidFill>
+            </a:endParaRPr>
+          </a:p>
+          <a:p>
+            <a:pPr marL="285750" indent="-285750" algn="ctr">
+              <a:buFontTx/>
+              <a:buChar char="-"/>
+            </a:pPr>
+            <a:r>
+              <a:rPr lang="en-US" dirty="0" err="1">
+                <a:solidFill>
+                  <a:schemeClr val="bg1"/>
+                </a:solidFill>
+              </a:rPr>
+              <a:t>DesconectarCursor</a:t>
+            </a:r>
+            <a:endParaRPr lang="en-US" dirty="0">
+              <a:solidFill>
+                <a:schemeClr val="bg1"/>
+              </a:solidFill>
+            </a:endParaRPr>
+          </a:p>
           <a:p>
             <a:pPr marL="285750" indent="-285750" algn="ctr">
               <a:buFontTx/>
@@ -9298,6 +9374,15 @@
 </file>
 
 <file path=customXml/item2.xml><?xml version="1.0" encoding="utf-8"?>
+<?mso-contentType ?>
+<FormTemplates xmlns="http://schemas.microsoft.com/sharepoint/v3/contenttype/forms">
+  <Display>DocumentLibraryForm</Display>
+  <Edit>DocumentLibraryForm</Edit>
+  <New>DocumentLibraryForm</New>
+</FormTemplates>
+</file>
+
+<file path=customXml/item3.xml><?xml version="1.0" encoding="utf-8"?>
 <ct:contentTypeSchema xmlns:ct="http://schemas.microsoft.com/office/2006/metadata/contentType" xmlns:ma="http://schemas.microsoft.com/office/2006/metadata/properties/metaAttributes" ct:_="" ma:_="" ma:contentTypeName="Document" ma:contentTypeID="0x010100C3F2F542F24BDE4A8BDD1F998CE000E0" ma:contentTypeVersion="0" ma:contentTypeDescription="Create a new document." ma:contentTypeScope="" ma:versionID="83c008e66cd718e5434bebb352930021">
   <xsd:schema xmlns:xsd="http://www.w3.org/2001/XMLSchema" xmlns:xs="http://www.w3.org/2001/XMLSchema" xmlns:p="http://schemas.microsoft.com/office/2006/metadata/properties" targetNamespace="http://schemas.microsoft.com/office/2006/metadata/properties" ma:root="true" ma:fieldsID="03894abc7ab974918b1bcad8e2aab8dc">
     <xsd:element name="properties">
@@ -9411,15 +9496,6 @@
 </ct:contentTypeSchema>
 </file>
 
-<file path=customXml/item3.xml><?xml version="1.0" encoding="utf-8"?>
-<?mso-contentType ?>
-<FormTemplates xmlns="http://schemas.microsoft.com/sharepoint/v3/contenttype/forms">
-  <Display>DocumentLibraryForm</Display>
-  <Edit>DocumentLibraryForm</Edit>
-  <New>DocumentLibraryForm</New>
-</FormTemplates>
-</file>
-
 <file path=customXml/itemProps1.xml><?xml version="1.0" encoding="utf-8"?>
 <ds:datastoreItem xmlns:ds="http://schemas.openxmlformats.org/officeDocument/2006/customXml" ds:itemID="{D92A37AC-82B8-4757-B769-8788BA0CD134}">
   <ds:schemaRefs>
@@ -9436,6 +9512,14 @@
 </file>
 
 <file path=customXml/itemProps2.xml><?xml version="1.0" encoding="utf-8"?>
+<ds:datastoreItem xmlns:ds="http://schemas.openxmlformats.org/officeDocument/2006/customXml" ds:itemID="{5C305631-AD9C-4BAB-B2EF-E6B08D4CD95A}">
+  <ds:schemaRefs>
+    <ds:schemaRef ds:uri="http://schemas.microsoft.com/sharepoint/v3/contenttype/forms"/>
+  </ds:schemaRefs>
+</ds:datastoreItem>
+</file>
+
+<file path=customXml/itemProps3.xml><?xml version="1.0" encoding="utf-8"?>
 <ds:datastoreItem xmlns:ds="http://schemas.openxmlformats.org/officeDocument/2006/customXml" ds:itemID="{22369BFB-2BFA-4153-B86E-B451C23AA0DB}">
   <ds:schemaRefs>
     <ds:schemaRef ds:uri="http://schemas.microsoft.com/office/2006/metadata/contentType"/>
@@ -9449,12 +9533,4 @@
     <ds:schemaRef ds:uri="http://schemas.microsoft.com/office/infopath/2007/PartnerControls"/>
   </ds:schemaRefs>
 </ds:datastoreItem>
-</file>
-
-<file path=customXml/itemProps3.xml><?xml version="1.0" encoding="utf-8"?>
-<ds:datastoreItem xmlns:ds="http://schemas.openxmlformats.org/officeDocument/2006/customXml" ds:itemID="{5C305631-AD9C-4BAB-B2EF-E6B08D4CD95A}">
-  <ds:schemaRefs>
-    <ds:schemaRef ds:uri="http://schemas.microsoft.com/sharepoint/v3/contenttype/forms"/>
-  </ds:schemaRefs>
-</ds:datastoreItem>
 </file>
</xml_diff>

<commit_message>
Self Improvement classe outlookmail - exportação da função dispara_email
</commit_message>
<xml_diff>
--- a/project/Disparador de e-mails.pptx
+++ b/project/Disparador de e-mails.pptx
@@ -9008,57 +9008,6 @@
           </a:p>
         </p:txBody>
       </p:sp>
-      <p:sp>
-        <p:nvSpPr>
-          <p:cNvPr id="7" name="CaixaDeTexto 6">
-            <a:extLst>
-              <a:ext uri="{FF2B5EF4-FFF2-40B4-BE49-F238E27FC236}">
-                <a16:creationId xmlns:a16="http://schemas.microsoft.com/office/drawing/2014/main" id="{D94CC84C-1387-400A-9A5E-54007618BFFB}"/>
-              </a:ext>
-            </a:extLst>
-          </p:cNvPr>
-          <p:cNvSpPr txBox="1"/>
-          <p:nvPr/>
-        </p:nvSpPr>
-        <p:spPr>
-          <a:xfrm>
-            <a:off x="3352800" y="5594128"/>
-            <a:ext cx="5486400" cy="369332"/>
-          </a:xfrm>
-          <a:prstGeom prst="rect">
-            <a:avLst/>
-          </a:prstGeom>
-          <a:noFill/>
-        </p:spPr>
-        <p:txBody>
-          <a:bodyPr wrap="square" rtlCol="0">
-            <a:spAutoFit/>
-          </a:bodyPr>
-          <a:lstStyle/>
-          <a:p>
-            <a:pPr marL="285750" indent="-285750" algn="ctr">
-              <a:buFontTx/>
-              <a:buChar char="-"/>
-            </a:pPr>
-            <a:r>
-              <a:rPr lang="en-US" dirty="0" err="1">
-                <a:solidFill>
-                  <a:schemeClr val="bg1"/>
-                </a:solidFill>
-              </a:rPr>
-              <a:t>Enviar</a:t>
-            </a:r>
-            <a:r>
-              <a:rPr lang="en-US" dirty="0">
-                <a:solidFill>
-                  <a:schemeClr val="bg1"/>
-                </a:solidFill>
-              </a:rPr>
-              <a:t> e-mail</a:t>
-            </a:r>
-          </a:p>
-        </p:txBody>
-      </p:sp>
     </p:spTree>
     <p:extLst>
       <p:ext uri="{BB962C8B-B14F-4D97-AF65-F5344CB8AC3E}">
@@ -9374,15 +9323,6 @@
 </file>
 
 <file path=customXml/item2.xml><?xml version="1.0" encoding="utf-8"?>
-<?mso-contentType ?>
-<FormTemplates xmlns="http://schemas.microsoft.com/sharepoint/v3/contenttype/forms">
-  <Display>DocumentLibraryForm</Display>
-  <Edit>DocumentLibraryForm</Edit>
-  <New>DocumentLibraryForm</New>
-</FormTemplates>
-</file>
-
-<file path=customXml/item3.xml><?xml version="1.0" encoding="utf-8"?>
 <ct:contentTypeSchema xmlns:ct="http://schemas.microsoft.com/office/2006/metadata/contentType" xmlns:ma="http://schemas.microsoft.com/office/2006/metadata/properties/metaAttributes" ct:_="" ma:_="" ma:contentTypeName="Document" ma:contentTypeID="0x010100C3F2F542F24BDE4A8BDD1F998CE000E0" ma:contentTypeVersion="0" ma:contentTypeDescription="Create a new document." ma:contentTypeScope="" ma:versionID="83c008e66cd718e5434bebb352930021">
   <xsd:schema xmlns:xsd="http://www.w3.org/2001/XMLSchema" xmlns:xs="http://www.w3.org/2001/XMLSchema" xmlns:p="http://schemas.microsoft.com/office/2006/metadata/properties" targetNamespace="http://schemas.microsoft.com/office/2006/metadata/properties" ma:root="true" ma:fieldsID="03894abc7ab974918b1bcad8e2aab8dc">
     <xsd:element name="properties">
@@ -9496,6 +9436,15 @@
 </ct:contentTypeSchema>
 </file>
 
+<file path=customXml/item3.xml><?xml version="1.0" encoding="utf-8"?>
+<?mso-contentType ?>
+<FormTemplates xmlns="http://schemas.microsoft.com/sharepoint/v3/contenttype/forms">
+  <Display>DocumentLibraryForm</Display>
+  <Edit>DocumentLibraryForm</Edit>
+  <New>DocumentLibraryForm</New>
+</FormTemplates>
+</file>
+
 <file path=customXml/itemProps1.xml><?xml version="1.0" encoding="utf-8"?>
 <ds:datastoreItem xmlns:ds="http://schemas.openxmlformats.org/officeDocument/2006/customXml" ds:itemID="{D92A37AC-82B8-4757-B769-8788BA0CD134}">
   <ds:schemaRefs>
@@ -9512,14 +9461,6 @@
 </file>
 
 <file path=customXml/itemProps2.xml><?xml version="1.0" encoding="utf-8"?>
-<ds:datastoreItem xmlns:ds="http://schemas.openxmlformats.org/officeDocument/2006/customXml" ds:itemID="{5C305631-AD9C-4BAB-B2EF-E6B08D4CD95A}">
-  <ds:schemaRefs>
-    <ds:schemaRef ds:uri="http://schemas.microsoft.com/sharepoint/v3/contenttype/forms"/>
-  </ds:schemaRefs>
-</ds:datastoreItem>
-</file>
-
-<file path=customXml/itemProps3.xml><?xml version="1.0" encoding="utf-8"?>
 <ds:datastoreItem xmlns:ds="http://schemas.openxmlformats.org/officeDocument/2006/customXml" ds:itemID="{22369BFB-2BFA-4153-B86E-B451C23AA0DB}">
   <ds:schemaRefs>
     <ds:schemaRef ds:uri="http://schemas.microsoft.com/office/2006/metadata/contentType"/>
@@ -9533,4 +9474,12 @@
     <ds:schemaRef ds:uri="http://schemas.microsoft.com/office/infopath/2007/PartnerControls"/>
   </ds:schemaRefs>
 </ds:datastoreItem>
+</file>
+
+<file path=customXml/itemProps3.xml><?xml version="1.0" encoding="utf-8"?>
+<ds:datastoreItem xmlns:ds="http://schemas.openxmlformats.org/officeDocument/2006/customXml" ds:itemID="{5C305631-AD9C-4BAB-B2EF-E6B08D4CD95A}">
+  <ds:schemaRefs>
+    <ds:schemaRef ds:uri="http://schemas.microsoft.com/sharepoint/v3/contenttype/forms"/>
+  </ds:schemaRefs>
+</ds:datastoreItem>
 </file>
</xml_diff>

<commit_message>
criando classe para comandos sql
</commit_message>
<xml_diff>
--- a/project/Disparador de e-mails.pptx
+++ b/project/Disparador de e-mails.pptx
@@ -18,7 +18,8 @@
     <p:sldId id="262" r:id="rId15"/>
     <p:sldId id="263" r:id="rId16"/>
     <p:sldId id="264" r:id="rId17"/>
-    <p:sldId id="265" r:id="rId18"/>
+    <p:sldId id="271" r:id="rId18"/>
+    <p:sldId id="265" r:id="rId19"/>
   </p:sldIdLst>
   <p:sldSz cx="12192000" cy="6858000"/>
   <p:notesSz cx="6858000" cy="9144000"/>
@@ -274,7 +275,7 @@
           <a:p>
             <a:fld id="{B83CCE6F-1D0A-4071-99E3-A2D64F5A9666}" type="datetimeFigureOut">
               <a:rPr lang="en-US" smtClean="0"/>
-              <a:t>4/22/2020</a:t>
+              <a:t>4/25/2020</a:t>
             </a:fld>
             <a:endParaRPr lang="en-US"/>
           </a:p>
@@ -474,7 +475,7 @@
           <a:p>
             <a:fld id="{B83CCE6F-1D0A-4071-99E3-A2D64F5A9666}" type="datetimeFigureOut">
               <a:rPr lang="en-US" smtClean="0"/>
-              <a:t>4/22/2020</a:t>
+              <a:t>4/25/2020</a:t>
             </a:fld>
             <a:endParaRPr lang="en-US"/>
           </a:p>
@@ -684,7 +685,7 @@
           <a:p>
             <a:fld id="{B83CCE6F-1D0A-4071-99E3-A2D64F5A9666}" type="datetimeFigureOut">
               <a:rPr lang="en-US" smtClean="0"/>
-              <a:t>4/22/2020</a:t>
+              <a:t>4/25/2020</a:t>
             </a:fld>
             <a:endParaRPr lang="en-US"/>
           </a:p>
@@ -884,7 +885,7 @@
           <a:p>
             <a:fld id="{B83CCE6F-1D0A-4071-99E3-A2D64F5A9666}" type="datetimeFigureOut">
               <a:rPr lang="en-US" smtClean="0"/>
-              <a:t>4/22/2020</a:t>
+              <a:t>4/25/2020</a:t>
             </a:fld>
             <a:endParaRPr lang="en-US"/>
           </a:p>
@@ -1160,7 +1161,7 @@
           <a:p>
             <a:fld id="{B83CCE6F-1D0A-4071-99E3-A2D64F5A9666}" type="datetimeFigureOut">
               <a:rPr lang="en-US" smtClean="0"/>
-              <a:t>4/22/2020</a:t>
+              <a:t>4/25/2020</a:t>
             </a:fld>
             <a:endParaRPr lang="en-US"/>
           </a:p>
@@ -1428,7 +1429,7 @@
           <a:p>
             <a:fld id="{B83CCE6F-1D0A-4071-99E3-A2D64F5A9666}" type="datetimeFigureOut">
               <a:rPr lang="en-US" smtClean="0"/>
-              <a:t>4/22/2020</a:t>
+              <a:t>4/25/2020</a:t>
             </a:fld>
             <a:endParaRPr lang="en-US"/>
           </a:p>
@@ -1843,7 +1844,7 @@
           <a:p>
             <a:fld id="{B83CCE6F-1D0A-4071-99E3-A2D64F5A9666}" type="datetimeFigureOut">
               <a:rPr lang="en-US" smtClean="0"/>
-              <a:t>4/22/2020</a:t>
+              <a:t>4/25/2020</a:t>
             </a:fld>
             <a:endParaRPr lang="en-US"/>
           </a:p>
@@ -1985,7 +1986,7 @@
           <a:p>
             <a:fld id="{B83CCE6F-1D0A-4071-99E3-A2D64F5A9666}" type="datetimeFigureOut">
               <a:rPr lang="en-US" smtClean="0"/>
-              <a:t>4/22/2020</a:t>
+              <a:t>4/25/2020</a:t>
             </a:fld>
             <a:endParaRPr lang="en-US"/>
           </a:p>
@@ -2098,7 +2099,7 @@
           <a:p>
             <a:fld id="{B83CCE6F-1D0A-4071-99E3-A2D64F5A9666}" type="datetimeFigureOut">
               <a:rPr lang="en-US" smtClean="0"/>
-              <a:t>4/22/2020</a:t>
+              <a:t>4/25/2020</a:t>
             </a:fld>
             <a:endParaRPr lang="en-US"/>
           </a:p>
@@ -2411,7 +2412,7 @@
           <a:p>
             <a:fld id="{B83CCE6F-1D0A-4071-99E3-A2D64F5A9666}" type="datetimeFigureOut">
               <a:rPr lang="en-US" smtClean="0"/>
-              <a:t>4/22/2020</a:t>
+              <a:t>4/25/2020</a:t>
             </a:fld>
             <a:endParaRPr lang="en-US"/>
           </a:p>
@@ -2700,7 +2701,7 @@
           <a:p>
             <a:fld id="{B83CCE6F-1D0A-4071-99E3-A2D64F5A9666}" type="datetimeFigureOut">
               <a:rPr lang="en-US" smtClean="0"/>
-              <a:t>4/22/2020</a:t>
+              <a:t>4/25/2020</a:t>
             </a:fld>
             <a:endParaRPr lang="en-US"/>
           </a:p>
@@ -2943,7 +2944,7 @@
           <a:p>
             <a:fld id="{B83CCE6F-1D0A-4071-99E3-A2D64F5A9666}" type="datetimeFigureOut">
               <a:rPr lang="en-US" smtClean="0"/>
-              <a:t>4/22/2020</a:t>
+              <a:t>4/25/2020</a:t>
             </a:fld>
             <a:endParaRPr lang="en-US"/>
           </a:p>
@@ -5139,6 +5140,315 @@
         <p:spPr>
           <a:xfrm>
             <a:off x="0" y="10632"/>
+            <a:ext cx="12192000" cy="914400"/>
+          </a:xfrm>
+          <a:prstGeom prst="rect">
+            <a:avLst/>
+          </a:prstGeom>
+        </p:spPr>
+        <p:style>
+          <a:lnRef idx="2">
+            <a:schemeClr val="accent1">
+              <a:shade val="50000"/>
+            </a:schemeClr>
+          </a:lnRef>
+          <a:fillRef idx="1">
+            <a:schemeClr val="accent1"/>
+          </a:fillRef>
+          <a:effectRef idx="0">
+            <a:schemeClr val="accent1"/>
+          </a:effectRef>
+          <a:fontRef idx="minor">
+            <a:schemeClr val="lt1"/>
+          </a:fontRef>
+        </p:style>
+        <p:txBody>
+          <a:bodyPr rtlCol="0" anchor="ctr"/>
+          <a:lstStyle/>
+          <a:p>
+            <a:pPr algn="ctr"/>
+            <a:r>
+              <a:rPr lang="en-US" sz="4800" b="1" dirty="0" err="1"/>
+              <a:t>Classe</a:t>
+            </a:r>
+            <a:r>
+              <a:rPr lang="en-US" sz="4800" b="1" dirty="0"/>
+              <a:t>: </a:t>
+            </a:r>
+            <a:r>
+              <a:rPr lang="en-US" sz="4800" b="1"/>
+              <a:t>ComandoSQL</a:t>
+            </a:r>
+            <a:endParaRPr lang="en-US" sz="4800" b="1" dirty="0"/>
+          </a:p>
+        </p:txBody>
+      </p:sp>
+      <p:sp>
+        <p:nvSpPr>
+          <p:cNvPr id="8" name="Retângulo: Cantos Arredondados 7">
+            <a:extLst>
+              <a:ext uri="{FF2B5EF4-FFF2-40B4-BE49-F238E27FC236}">
+                <a16:creationId xmlns:a16="http://schemas.microsoft.com/office/drawing/2014/main" id="{66D3D3C5-85D6-4950-ACFE-15F8C0A7478E}"/>
+              </a:ext>
+            </a:extLst>
+          </p:cNvPr>
+          <p:cNvSpPr/>
+          <p:nvPr/>
+        </p:nvSpPr>
+        <p:spPr>
+          <a:xfrm>
+            <a:off x="3352800" y="1190845"/>
+            <a:ext cx="5486400" cy="5486400"/>
+          </a:xfrm>
+          <a:prstGeom prst="roundRect">
+            <a:avLst/>
+          </a:prstGeom>
+        </p:spPr>
+        <p:style>
+          <a:lnRef idx="2">
+            <a:schemeClr val="accent1">
+              <a:shade val="50000"/>
+            </a:schemeClr>
+          </a:lnRef>
+          <a:fillRef idx="1">
+            <a:schemeClr val="accent1"/>
+          </a:fillRef>
+          <a:effectRef idx="0">
+            <a:schemeClr val="accent1"/>
+          </a:effectRef>
+          <a:fontRef idx="minor">
+            <a:schemeClr val="lt1"/>
+          </a:fontRef>
+        </p:style>
+        <p:txBody>
+          <a:bodyPr rtlCol="0" anchor="ctr"/>
+          <a:lstStyle/>
+          <a:p>
+            <a:pPr algn="ctr"/>
+            <a:endParaRPr lang="en-US" dirty="0">
+              <a:solidFill>
+                <a:schemeClr val="bg1"/>
+              </a:solidFill>
+            </a:endParaRPr>
+          </a:p>
+        </p:txBody>
+      </p:sp>
+      <p:cxnSp>
+        <p:nvCxnSpPr>
+          <p:cNvPr id="13" name="Conector reto 12">
+            <a:extLst>
+              <a:ext uri="{FF2B5EF4-FFF2-40B4-BE49-F238E27FC236}">
+                <a16:creationId xmlns:a16="http://schemas.microsoft.com/office/drawing/2014/main" id="{295AA056-CE0A-476E-BB73-0EB04C2B2DE3}"/>
+              </a:ext>
+            </a:extLst>
+          </p:cNvPr>
+          <p:cNvCxnSpPr>
+            <a:cxnSpLocks/>
+          </p:cNvCxnSpPr>
+          <p:nvPr/>
+        </p:nvCxnSpPr>
+        <p:spPr>
+          <a:xfrm>
+            <a:off x="3352800" y="4405752"/>
+            <a:ext cx="5486400" cy="0"/>
+          </a:xfrm>
+          <a:prstGeom prst="line">
+            <a:avLst/>
+          </a:prstGeom>
+        </p:spPr>
+        <p:style>
+          <a:lnRef idx="1">
+            <a:schemeClr val="dk1"/>
+          </a:lnRef>
+          <a:fillRef idx="0">
+            <a:schemeClr val="dk1"/>
+          </a:fillRef>
+          <a:effectRef idx="0">
+            <a:schemeClr val="dk1"/>
+          </a:effectRef>
+          <a:fontRef idx="minor">
+            <a:schemeClr val="tx1"/>
+          </a:fontRef>
+        </p:style>
+      </p:cxnSp>
+      <p:sp>
+        <p:nvSpPr>
+          <p:cNvPr id="5" name="CaixaDeTexto 4">
+            <a:extLst>
+              <a:ext uri="{FF2B5EF4-FFF2-40B4-BE49-F238E27FC236}">
+                <a16:creationId xmlns:a16="http://schemas.microsoft.com/office/drawing/2014/main" id="{0212C14D-AC41-49EC-AE63-641DB9129437}"/>
+              </a:ext>
+            </a:extLst>
+          </p:cNvPr>
+          <p:cNvSpPr txBox="1"/>
+          <p:nvPr/>
+        </p:nvSpPr>
+        <p:spPr>
+          <a:xfrm>
+            <a:off x="3352800" y="1297172"/>
+            <a:ext cx="5486400" cy="707886"/>
+          </a:xfrm>
+          <a:prstGeom prst="rect">
+            <a:avLst/>
+          </a:prstGeom>
+          <a:noFill/>
+        </p:spPr>
+        <p:txBody>
+          <a:bodyPr wrap="square" rtlCol="0">
+            <a:spAutoFit/>
+          </a:bodyPr>
+          <a:lstStyle/>
+          <a:p>
+            <a:pPr algn="ctr"/>
+            <a:r>
+              <a:rPr lang="en-US" sz="4000" dirty="0" err="1">
+                <a:solidFill>
+                  <a:schemeClr val="bg1"/>
+                </a:solidFill>
+              </a:rPr>
+              <a:t>ComandoSQL</a:t>
+            </a:r>
+            <a:endParaRPr lang="en-US" sz="4000" dirty="0">
+              <a:solidFill>
+                <a:schemeClr val="bg1"/>
+              </a:solidFill>
+            </a:endParaRPr>
+          </a:p>
+        </p:txBody>
+      </p:sp>
+      <p:sp>
+        <p:nvSpPr>
+          <p:cNvPr id="6" name="CaixaDeTexto 5">
+            <a:extLst>
+              <a:ext uri="{FF2B5EF4-FFF2-40B4-BE49-F238E27FC236}">
+                <a16:creationId xmlns:a16="http://schemas.microsoft.com/office/drawing/2014/main" id="{AD57D7D4-D609-4B55-8AB1-0C33379D4373}"/>
+              </a:ext>
+            </a:extLst>
+          </p:cNvPr>
+          <p:cNvSpPr txBox="1"/>
+          <p:nvPr/>
+        </p:nvSpPr>
+        <p:spPr>
+          <a:xfrm>
+            <a:off x="3352800" y="2374427"/>
+            <a:ext cx="5486400" cy="369332"/>
+          </a:xfrm>
+          <a:prstGeom prst="rect">
+            <a:avLst/>
+          </a:prstGeom>
+          <a:noFill/>
+        </p:spPr>
+        <p:txBody>
+          <a:bodyPr wrap="square" rtlCol="0">
+            <a:spAutoFit/>
+          </a:bodyPr>
+          <a:lstStyle/>
+          <a:p>
+            <a:pPr marL="285750" indent="-285750" algn="ctr">
+              <a:buFontTx/>
+              <a:buChar char="-"/>
+            </a:pPr>
+            <a:r>
+              <a:rPr lang="en-US" dirty="0" err="1">
+                <a:solidFill>
+                  <a:schemeClr val="bg1"/>
+                </a:solidFill>
+              </a:rPr>
+              <a:t>ComandoSQL</a:t>
+            </a:r>
+            <a:endParaRPr lang="en-US" dirty="0">
+              <a:solidFill>
+                <a:schemeClr val="bg1"/>
+              </a:solidFill>
+            </a:endParaRPr>
+          </a:p>
+        </p:txBody>
+      </p:sp>
+      <p:sp>
+        <p:nvSpPr>
+          <p:cNvPr id="7" name="CaixaDeTexto 6">
+            <a:extLst>
+              <a:ext uri="{FF2B5EF4-FFF2-40B4-BE49-F238E27FC236}">
+                <a16:creationId xmlns:a16="http://schemas.microsoft.com/office/drawing/2014/main" id="{C1BAC4BC-0F1A-4C39-B300-767AD1F4D33B}"/>
+              </a:ext>
+            </a:extLst>
+          </p:cNvPr>
+          <p:cNvSpPr txBox="1"/>
+          <p:nvPr/>
+        </p:nvSpPr>
+        <p:spPr>
+          <a:xfrm>
+            <a:off x="3352800" y="4683665"/>
+            <a:ext cx="5486400" cy="369332"/>
+          </a:xfrm>
+          <a:prstGeom prst="rect">
+            <a:avLst/>
+          </a:prstGeom>
+          <a:noFill/>
+        </p:spPr>
+        <p:txBody>
+          <a:bodyPr wrap="square" rtlCol="0">
+            <a:spAutoFit/>
+          </a:bodyPr>
+          <a:lstStyle/>
+          <a:p>
+            <a:pPr marL="285750" indent="-285750" algn="ctr">
+              <a:buFontTx/>
+              <a:buChar char="-"/>
+            </a:pPr>
+            <a:endParaRPr lang="en-US" dirty="0">
+              <a:solidFill>
+                <a:schemeClr val="bg1"/>
+              </a:solidFill>
+            </a:endParaRPr>
+          </a:p>
+        </p:txBody>
+      </p:sp>
+    </p:spTree>
+    <p:extLst>
+      <p:ext uri="{BB962C8B-B14F-4D97-AF65-F5344CB8AC3E}">
+        <p14:creationId xmlns:p14="http://schemas.microsoft.com/office/powerpoint/2010/main" val="1210570669"/>
+      </p:ext>
+    </p:extLst>
+  </p:cSld>
+  <p:clrMapOvr>
+    <a:masterClrMapping/>
+  </p:clrMapOvr>
+</p:sld>
+</file>
+
+<file path=ppt/slides/slide15.xml><?xml version="1.0" encoding="utf-8"?>
+<p:sld xmlns:a="http://schemas.openxmlformats.org/drawingml/2006/main" xmlns:r="http://schemas.openxmlformats.org/officeDocument/2006/relationships" xmlns:p="http://schemas.openxmlformats.org/presentationml/2006/main">
+  <p:cSld>
+    <p:spTree>
+      <p:nvGrpSpPr>
+        <p:cNvPr id="1" name=""/>
+        <p:cNvGrpSpPr/>
+        <p:nvPr/>
+      </p:nvGrpSpPr>
+      <p:grpSpPr>
+        <a:xfrm>
+          <a:off x="0" y="0"/>
+          <a:ext cx="0" cy="0"/>
+          <a:chOff x="0" y="0"/>
+          <a:chExt cx="0" cy="0"/>
+        </a:xfrm>
+      </p:grpSpPr>
+      <p:sp>
+        <p:nvSpPr>
+          <p:cNvPr id="4" name="Retângulo 3">
+            <a:extLst>
+              <a:ext uri="{FF2B5EF4-FFF2-40B4-BE49-F238E27FC236}">
+                <a16:creationId xmlns:a16="http://schemas.microsoft.com/office/drawing/2014/main" id="{05CFC605-78C2-4782-82CA-7D8B351A2C7C}"/>
+              </a:ext>
+            </a:extLst>
+          </p:cNvPr>
+          <p:cNvSpPr/>
+          <p:nvPr/>
+        </p:nvSpPr>
+        <p:spPr>
+          <a:xfrm>
+            <a:off x="0" y="10632"/>
             <a:ext cx="12192000" cy="680483"/>
           </a:xfrm>
           <a:prstGeom prst="rect">
@@ -9323,6 +9633,15 @@
 </file>
 
 <file path=customXml/item2.xml><?xml version="1.0" encoding="utf-8"?>
+<?mso-contentType ?>
+<FormTemplates xmlns="http://schemas.microsoft.com/sharepoint/v3/contenttype/forms">
+  <Display>DocumentLibraryForm</Display>
+  <Edit>DocumentLibraryForm</Edit>
+  <New>DocumentLibraryForm</New>
+</FormTemplates>
+</file>
+
+<file path=customXml/item3.xml><?xml version="1.0" encoding="utf-8"?>
 <ct:contentTypeSchema xmlns:ct="http://schemas.microsoft.com/office/2006/metadata/contentType" xmlns:ma="http://schemas.microsoft.com/office/2006/metadata/properties/metaAttributes" ct:_="" ma:_="" ma:contentTypeName="Document" ma:contentTypeID="0x010100C3F2F542F24BDE4A8BDD1F998CE000E0" ma:contentTypeVersion="0" ma:contentTypeDescription="Create a new document." ma:contentTypeScope="" ma:versionID="83c008e66cd718e5434bebb352930021">
   <xsd:schema xmlns:xsd="http://www.w3.org/2001/XMLSchema" xmlns:xs="http://www.w3.org/2001/XMLSchema" xmlns:p="http://schemas.microsoft.com/office/2006/metadata/properties" targetNamespace="http://schemas.microsoft.com/office/2006/metadata/properties" ma:root="true" ma:fieldsID="03894abc7ab974918b1bcad8e2aab8dc">
     <xsd:element name="properties">
@@ -9436,15 +9755,6 @@
 </ct:contentTypeSchema>
 </file>
 
-<file path=customXml/item3.xml><?xml version="1.0" encoding="utf-8"?>
-<?mso-contentType ?>
-<FormTemplates xmlns="http://schemas.microsoft.com/sharepoint/v3/contenttype/forms">
-  <Display>DocumentLibraryForm</Display>
-  <Edit>DocumentLibraryForm</Edit>
-  <New>DocumentLibraryForm</New>
-</FormTemplates>
-</file>
-
 <file path=customXml/itemProps1.xml><?xml version="1.0" encoding="utf-8"?>
 <ds:datastoreItem xmlns:ds="http://schemas.openxmlformats.org/officeDocument/2006/customXml" ds:itemID="{D92A37AC-82B8-4757-B769-8788BA0CD134}">
   <ds:schemaRefs>
@@ -9461,6 +9771,14 @@
 </file>
 
 <file path=customXml/itemProps2.xml><?xml version="1.0" encoding="utf-8"?>
+<ds:datastoreItem xmlns:ds="http://schemas.openxmlformats.org/officeDocument/2006/customXml" ds:itemID="{5C305631-AD9C-4BAB-B2EF-E6B08D4CD95A}">
+  <ds:schemaRefs>
+    <ds:schemaRef ds:uri="http://schemas.microsoft.com/sharepoint/v3/contenttype/forms"/>
+  </ds:schemaRefs>
+</ds:datastoreItem>
+</file>
+
+<file path=customXml/itemProps3.xml><?xml version="1.0" encoding="utf-8"?>
 <ds:datastoreItem xmlns:ds="http://schemas.openxmlformats.org/officeDocument/2006/customXml" ds:itemID="{22369BFB-2BFA-4153-B86E-B451C23AA0DB}">
   <ds:schemaRefs>
     <ds:schemaRef ds:uri="http://schemas.microsoft.com/office/2006/metadata/contentType"/>
@@ -9474,12 +9792,4 @@
     <ds:schemaRef ds:uri="http://schemas.microsoft.com/office/infopath/2007/PartnerControls"/>
   </ds:schemaRefs>
 </ds:datastoreItem>
-</file>
-
-<file path=customXml/itemProps3.xml><?xml version="1.0" encoding="utf-8"?>
-<ds:datastoreItem xmlns:ds="http://schemas.openxmlformats.org/officeDocument/2006/customXml" ds:itemID="{5C305631-AD9C-4BAB-B2EF-E6B08D4CD95A}">
-  <ds:schemaRefs>
-    <ds:schemaRef ds:uri="http://schemas.microsoft.com/sharepoint/v3/contenttype/forms"/>
-  </ds:schemaRefs>
-</ds:datastoreItem>
 </file>
</xml_diff>